<commit_message>
Updated presentation and added .pdf version (#293)
</commit_message>
<xml_diff>
--- a/ArturGrabowski/Presentation_ProblemyObiektowe.pptx
+++ b/ArturGrabowski/Presentation_ProblemyObiektowe.pptx
@@ -5,16 +5,19 @@
     <p:sldMasterId id="2147483648" r:id="rId1"/>
   </p:sldMasterIdLst>
   <p:notesMasterIdLst>
-    <p:notesMasterId r:id="rId6"/>
+    <p:notesMasterId r:id="rId9"/>
   </p:notesMasterIdLst>
   <p:handoutMasterIdLst>
-    <p:handoutMasterId r:id="rId7"/>
+    <p:handoutMasterId r:id="rId10"/>
   </p:handoutMasterIdLst>
   <p:sldIdLst>
     <p:sldId id="256" r:id="rId2"/>
-    <p:sldId id="257" r:id="rId3"/>
+    <p:sldId id="262" r:id="rId3"/>
     <p:sldId id="259" r:id="rId4"/>
-    <p:sldId id="258" r:id="rId5"/>
+    <p:sldId id="260" r:id="rId5"/>
+    <p:sldId id="257" r:id="rId6"/>
+    <p:sldId id="258" r:id="rId7"/>
+    <p:sldId id="261" r:id="rId8"/>
   </p:sldIdLst>
   <p:sldSz cx="12192000" cy="6858000"/>
   <p:notesSz cx="6858000" cy="9144000"/>
@@ -128,6 +131,8 @@
 <p1510:revInfo xmlns:a="http://schemas.openxmlformats.org/drawingml/2006/main" xmlns:r="http://schemas.openxmlformats.org/officeDocument/2006/relationships" xmlns:p1510="http://schemas.microsoft.com/office/powerpoint/2015/10/main">
   <p1510:revLst>
     <p1510:client id="{7B7B5FFC-2974-4AB4-9ABF-A87A6F08DC3D}" v="107" dt="2022-11-24T16:59:22.267"/>
+    <p1510:client id="{9B7AC77F-33B3-C5EE-C85E-C0C5F89EC96D}" v="169" dt="2022-12-08T20:41:57.624"/>
+    <p1510:client id="{E64A99DA-3A38-E95F-A7A6-307FA6319495}" v="134" dt="2022-12-07T18:30:51.176"/>
   </p1510:revLst>
 </p1510:revInfo>
 </file>
@@ -226,9 +231,9 @@
           <a:p>
             <a:fld id="{482B0311-59F3-4F8E-8B5F-34364BDD8452}" type="datetime1">
               <a:rPr lang="pl-PL" smtClean="0"/>
-              <a:t>25.11.2022</a:t>
+              <a:t>08.12.2022</a:t>
             </a:fld>
-            <a:endParaRPr lang="pl-PL" dirty="0"/>
+            <a:endParaRPr lang="pl-PL"/>
           </a:p>
         </p:txBody>
       </p:sp>
@@ -404,9 +409,9 @@
             <a:fld id="{2DA520AC-0DE7-4941-8B77-B54707CF0D7E}" type="datetime1">
               <a:rPr lang="pl-PL" smtClean="0"/>
               <a:pPr/>
-              <a:t>25.11.2022</a:t>
+              <a:t>08.12.2022</a:t>
             </a:fld>
-            <a:endParaRPr lang="pl-PL" dirty="0"/>
+            <a:endParaRPr lang="pl-PL"/>
           </a:p>
         </p:txBody>
       </p:sp>
@@ -969,7 +974,7 @@
             <a:pPr rtl="0"/>
             <a:fld id="{3C35EB0C-446C-47AA-A14B-F086C6994593}" type="datetime1">
               <a:rPr lang="pl-PL" noProof="0" smtClean="0"/>
-              <a:t>25.11.2022</a:t>
+              <a:t>08.12.2022</a:t>
             </a:fld>
             <a:endParaRPr lang="pl-PL" noProof="0"/>
           </a:p>
@@ -1013,7 +1018,7 @@
             <a:pPr rtl="0"/>
             <a:fld id="{D57F1E4F-1CFF-5643-939E-217C01CDF565}" type="slidenum">
               <a:rPr lang="pl-PL" noProof="0" smtClean="0"/>
-              <a:pPr/>
+              <a:pPr rtl="0"/>
               <a:t>‹#›</a:t>
             </a:fld>
             <a:endParaRPr lang="pl-PL" noProof="0"/>
@@ -1235,7 +1240,7 @@
           <a:p>
             <a:pPr lvl="0" rtl="0"/>
             <a:r>
-              <a:rPr lang="pl-PL" noProof="0" dirty="0"/>
+              <a:rPr lang="pl-PL" noProof="0"/>
               <a:t>Kliknij, aby edytować style wzorca tekstu</a:t>
             </a:r>
           </a:p>
@@ -1259,7 +1264,7 @@
             <a:pPr rtl="0"/>
             <a:fld id="{A84E1783-9710-44AC-B6AE-B168CA5A9BB1}" type="datetime1">
               <a:rPr lang="pl-PL" noProof="0" smtClean="0"/>
-              <a:t>25.11.2022</a:t>
+              <a:t>08.12.2022</a:t>
             </a:fld>
             <a:endParaRPr lang="pl-PL" noProof="0"/>
           </a:p>
@@ -1303,7 +1308,7 @@
             <a:pPr rtl="0"/>
             <a:fld id="{D57F1E4F-1CFF-5643-939E-217C01CDF565}" type="slidenum">
               <a:rPr lang="pl-PL" noProof="0" smtClean="0"/>
-              <a:pPr/>
+              <a:pPr rtl="0"/>
               <a:t>‹#›</a:t>
             </a:fld>
             <a:endParaRPr lang="pl-PL" noProof="0"/>
@@ -1493,7 +1498,7 @@
           <a:p>
             <a:pPr lvl="0" rtl="0"/>
             <a:r>
-              <a:rPr lang="pl-PL" noProof="0" dirty="0"/>
+              <a:rPr lang="pl-PL" noProof="0"/>
               <a:t>Kliknij, aby edytować style wzorca tekstu</a:t>
             </a:r>
           </a:p>
@@ -1517,7 +1522,7 @@
             <a:pPr rtl="0"/>
             <a:fld id="{4B38E59C-DA21-451B-AE2E-5F35B3A491DF}" type="datetime1">
               <a:rPr lang="pl-PL" noProof="0" smtClean="0"/>
-              <a:t>25.11.2022</a:t>
+              <a:t>08.12.2022</a:t>
             </a:fld>
             <a:endParaRPr lang="pl-PL" noProof="0"/>
           </a:p>
@@ -1561,7 +1566,7 @@
             <a:pPr rtl="0"/>
             <a:fld id="{D57F1E4F-1CFF-5643-939E-217C01CDF565}" type="slidenum">
               <a:rPr lang="pl-PL" noProof="0" smtClean="0"/>
-              <a:pPr/>
+              <a:pPr rtl="0"/>
               <a:t>‹#›</a:t>
             </a:fld>
             <a:endParaRPr lang="pl-PL" noProof="0"/>
@@ -1909,7 +1914,7 @@
           <a:p>
             <a:pPr lvl="0" rtl="0"/>
             <a:r>
-              <a:rPr lang="pl-PL" noProof="0" dirty="0"/>
+              <a:rPr lang="pl-PL" noProof="0"/>
               <a:t>Kliknij, aby edytować style wzorca tekstu</a:t>
             </a:r>
           </a:p>
@@ -1961,7 +1966,7 @@
               <a:buNone/>
             </a:pPr>
             <a:r>
-              <a:rPr lang="pl-PL" noProof="0" dirty="0"/>
+              <a:rPr lang="pl-PL" noProof="0"/>
               <a:t>Kliknij, aby edytować style wzorca tekstu</a:t>
             </a:r>
           </a:p>
@@ -1985,7 +1990,7 @@
             <a:pPr rtl="0"/>
             <a:fld id="{37D2BEDC-6AC9-4395-8696-DE661345E8EA}" type="datetime1">
               <a:rPr lang="pl-PL" noProof="0" smtClean="0"/>
-              <a:t>25.11.2022</a:t>
+              <a:t>08.12.2022</a:t>
             </a:fld>
             <a:endParaRPr lang="pl-PL" noProof="0"/>
           </a:p>
@@ -2029,7 +2034,7 @@
             <a:pPr rtl="0"/>
             <a:fld id="{D57F1E4F-1CFF-5643-939E-217C01CDF565}" type="slidenum">
               <a:rPr lang="pl-PL" noProof="0" smtClean="0"/>
-              <a:pPr/>
+              <a:pPr rtl="0"/>
               <a:t>‹#›</a:t>
             </a:fld>
             <a:endParaRPr lang="pl-PL" noProof="0"/>
@@ -2140,7 +2145,7 @@
               <a:buNone/>
             </a:pPr>
             <a:r>
-              <a:rPr lang="pl-PL" noProof="0" dirty="0"/>
+              <a:rPr lang="pl-PL" noProof="0"/>
               <a:t>Kliknij, aby edytować style wzorca tekstu</a:t>
             </a:r>
           </a:p>
@@ -2164,7 +2169,7 @@
             <a:pPr rtl="0"/>
             <a:fld id="{54435F55-D8B6-40F8-97C1-90A5D2E3DD78}" type="datetime1">
               <a:rPr lang="pl-PL" noProof="0" smtClean="0"/>
-              <a:t>25.11.2022</a:t>
+              <a:t>08.12.2022</a:t>
             </a:fld>
             <a:endParaRPr lang="pl-PL" noProof="0"/>
           </a:p>
@@ -2208,7 +2213,7 @@
             <a:pPr rtl="0"/>
             <a:fld id="{D57F1E4F-1CFF-5643-939E-217C01CDF565}" type="slidenum">
               <a:rPr lang="pl-PL" noProof="0" smtClean="0"/>
-              <a:pPr/>
+              <a:pPr rtl="0"/>
               <a:t>‹#›</a:t>
             </a:fld>
             <a:endParaRPr lang="pl-PL" noProof="0"/>
@@ -2585,7 +2590,7 @@
               <a:buNone/>
             </a:pPr>
             <a:r>
-              <a:rPr lang="pl-PL" noProof="0" dirty="0"/>
+              <a:rPr lang="pl-PL" noProof="0"/>
               <a:t>Kliknij, aby edytować style wzorca tekstu</a:t>
             </a:r>
           </a:p>
@@ -2715,7 +2720,7 @@
           <a:p>
             <a:pPr lvl="0" rtl="0"/>
             <a:r>
-              <a:rPr lang="pl-PL" noProof="0" dirty="0"/>
+              <a:rPr lang="pl-PL" noProof="0"/>
               <a:t>Kliknij, aby edytować style wzorca tekstu</a:t>
             </a:r>
           </a:p>
@@ -2739,7 +2744,7 @@
             <a:pPr rtl="0"/>
             <a:fld id="{2317D2E3-7CA7-4684-9159-438660326B58}" type="datetime1">
               <a:rPr lang="pl-PL" noProof="0" smtClean="0"/>
-              <a:t>25.11.2022</a:t>
+              <a:t>08.12.2022</a:t>
             </a:fld>
             <a:endParaRPr lang="pl-PL" noProof="0"/>
           </a:p>
@@ -2783,7 +2788,7 @@
             <a:pPr rtl="0"/>
             <a:fld id="{D57F1E4F-1CFF-5643-939E-217C01CDF565}" type="slidenum">
               <a:rPr lang="pl-PL" noProof="0" smtClean="0"/>
-              <a:pPr/>
+              <a:pPr rtl="0"/>
               <a:t>‹#›</a:t>
             </a:fld>
             <a:endParaRPr lang="pl-PL" noProof="0"/>
@@ -2915,7 +2920,7 @@
               <a:buNone/>
             </a:pPr>
             <a:r>
-              <a:rPr lang="pl-PL" noProof="0" dirty="0"/>
+              <a:rPr lang="pl-PL" noProof="0"/>
               <a:t>Kliknij, aby edytować style wzorca tekstu</a:t>
             </a:r>
           </a:p>
@@ -3045,7 +3050,7 @@
           <a:p>
             <a:pPr lvl="0" rtl="0"/>
             <a:r>
-              <a:rPr lang="pl-PL" noProof="0" dirty="0"/>
+              <a:rPr lang="pl-PL" noProof="0"/>
               <a:t>Kliknij, aby edytować style wzorca tekstu</a:t>
             </a:r>
           </a:p>
@@ -3069,7 +3074,7 @@
             <a:pPr rtl="0"/>
             <a:fld id="{A254BA0A-6679-4634-B983-A10EF05C7CC3}" type="datetime1">
               <a:rPr lang="pl-PL" noProof="0" smtClean="0"/>
-              <a:t>25.11.2022</a:t>
+              <a:t>08.12.2022</a:t>
             </a:fld>
             <a:endParaRPr lang="pl-PL" noProof="0"/>
           </a:p>
@@ -3113,7 +3118,7 @@
             <a:pPr rtl="0"/>
             <a:fld id="{D57F1E4F-1CFF-5643-939E-217C01CDF565}" type="slidenum">
               <a:rPr lang="pl-PL" noProof="0" smtClean="0"/>
-              <a:pPr/>
+              <a:pPr rtl="0"/>
               <a:t>‹#›</a:t>
             </a:fld>
             <a:endParaRPr lang="pl-PL" noProof="0"/>
@@ -3190,35 +3195,35 @@
           <a:p>
             <a:pPr lvl="0" rtl="0"/>
             <a:r>
-              <a:rPr lang="pl-PL" noProof="0" dirty="0"/>
+              <a:rPr lang="pl-PL" noProof="0"/>
               <a:t>Kliknij, aby edytować style wzorca tekstu</a:t>
             </a:r>
           </a:p>
           <a:p>
             <a:pPr lvl="1" rtl="0"/>
             <a:r>
-              <a:rPr lang="pl-PL" noProof="0" dirty="0"/>
+              <a:rPr lang="pl-PL" noProof="0"/>
               <a:t>Drugi poziom</a:t>
             </a:r>
           </a:p>
           <a:p>
             <a:pPr lvl="2" rtl="0"/>
             <a:r>
-              <a:rPr lang="pl-PL" noProof="0" dirty="0"/>
+              <a:rPr lang="pl-PL" noProof="0"/>
               <a:t>Trzeci poziom</a:t>
             </a:r>
           </a:p>
           <a:p>
             <a:pPr lvl="3" rtl="0"/>
             <a:r>
-              <a:rPr lang="pl-PL" noProof="0" dirty="0"/>
+              <a:rPr lang="pl-PL" noProof="0"/>
               <a:t>Czwarty poziom</a:t>
             </a:r>
           </a:p>
           <a:p>
             <a:pPr lvl="4" rtl="0"/>
             <a:r>
-              <a:rPr lang="pl-PL" noProof="0" dirty="0"/>
+              <a:rPr lang="pl-PL" noProof="0"/>
               <a:t>Piąty poziom</a:t>
             </a:r>
           </a:p>
@@ -3242,7 +3247,7 @@
             <a:pPr rtl="0"/>
             <a:fld id="{49A0FAB7-404B-4EEE-ACE4-C388028A9688}" type="datetime1">
               <a:rPr lang="pl-PL" noProof="0" smtClean="0"/>
-              <a:t>25.11.2022</a:t>
+              <a:t>08.12.2022</a:t>
             </a:fld>
             <a:endParaRPr lang="pl-PL" noProof="0"/>
           </a:p>
@@ -3286,7 +3291,7 @@
             <a:pPr rtl="0"/>
             <a:fld id="{D57F1E4F-1CFF-5643-939E-217C01CDF565}" type="slidenum">
               <a:rPr lang="pl-PL" noProof="0" smtClean="0"/>
-              <a:pPr/>
+              <a:pPr rtl="0"/>
               <a:t>‹#›</a:t>
             </a:fld>
             <a:endParaRPr lang="pl-PL" noProof="0"/>
@@ -3368,35 +3373,35 @@
           <a:p>
             <a:pPr lvl="0" rtl="0"/>
             <a:r>
-              <a:rPr lang="pl-PL" noProof="0" dirty="0"/>
+              <a:rPr lang="pl-PL" noProof="0"/>
               <a:t>Kliknij, aby edytować style wzorca tekstu</a:t>
             </a:r>
           </a:p>
           <a:p>
             <a:pPr lvl="1" rtl="0"/>
             <a:r>
-              <a:rPr lang="pl-PL" noProof="0" dirty="0"/>
+              <a:rPr lang="pl-PL" noProof="0"/>
               <a:t>Drugi poziom</a:t>
             </a:r>
           </a:p>
           <a:p>
             <a:pPr lvl="2" rtl="0"/>
             <a:r>
-              <a:rPr lang="pl-PL" noProof="0" dirty="0"/>
+              <a:rPr lang="pl-PL" noProof="0"/>
               <a:t>Trzeci poziom</a:t>
             </a:r>
           </a:p>
           <a:p>
             <a:pPr lvl="3" rtl="0"/>
             <a:r>
-              <a:rPr lang="pl-PL" noProof="0" dirty="0"/>
+              <a:rPr lang="pl-PL" noProof="0"/>
               <a:t>Czwarty poziom</a:t>
             </a:r>
           </a:p>
           <a:p>
             <a:pPr lvl="4" rtl="0"/>
             <a:r>
-              <a:rPr lang="pl-PL" noProof="0" dirty="0"/>
+              <a:rPr lang="pl-PL" noProof="0"/>
               <a:t>Piąty poziom</a:t>
             </a:r>
           </a:p>
@@ -3420,7 +3425,7 @@
             <a:pPr rtl="0"/>
             <a:fld id="{35138FA2-A4AC-4C11-A047-CBBF247C5D81}" type="datetime1">
               <a:rPr lang="pl-PL" noProof="0" smtClean="0"/>
-              <a:t>25.11.2022</a:t>
+              <a:t>08.12.2022</a:t>
             </a:fld>
             <a:endParaRPr lang="pl-PL" noProof="0"/>
           </a:p>
@@ -3464,7 +3469,7 @@
             <a:pPr rtl="0"/>
             <a:fld id="{D57F1E4F-1CFF-5643-939E-217C01CDF565}" type="slidenum">
               <a:rPr lang="pl-PL" noProof="0" smtClean="0"/>
-              <a:pPr/>
+              <a:pPr rtl="0"/>
               <a:t>‹#›</a:t>
             </a:fld>
             <a:endParaRPr lang="pl-PL" noProof="0"/>
@@ -3536,35 +3541,35 @@
           <a:p>
             <a:pPr lvl="0" rtl="0"/>
             <a:r>
-              <a:rPr lang="pl-PL" noProof="0" dirty="0"/>
+              <a:rPr lang="pl-PL" noProof="0"/>
               <a:t>Kliknij, aby edytować style wzorca tekstu</a:t>
             </a:r>
           </a:p>
           <a:p>
             <a:pPr lvl="1" rtl="0"/>
             <a:r>
-              <a:rPr lang="pl-PL" noProof="0" dirty="0"/>
+              <a:rPr lang="pl-PL" noProof="0"/>
               <a:t>Drugi poziom</a:t>
             </a:r>
           </a:p>
           <a:p>
             <a:pPr lvl="2" rtl="0"/>
             <a:r>
-              <a:rPr lang="pl-PL" noProof="0" dirty="0"/>
+              <a:rPr lang="pl-PL" noProof="0"/>
               <a:t>Trzeci poziom</a:t>
             </a:r>
           </a:p>
           <a:p>
             <a:pPr lvl="3" rtl="0"/>
             <a:r>
-              <a:rPr lang="pl-PL" noProof="0" dirty="0"/>
+              <a:rPr lang="pl-PL" noProof="0"/>
               <a:t>Czwarty poziom</a:t>
             </a:r>
           </a:p>
           <a:p>
             <a:pPr lvl="4" rtl="0"/>
             <a:r>
-              <a:rPr lang="pl-PL" noProof="0" dirty="0"/>
+              <a:rPr lang="pl-PL" noProof="0"/>
               <a:t>Piąty poziom</a:t>
             </a:r>
           </a:p>
@@ -3588,7 +3593,7 @@
             <a:pPr rtl="0"/>
             <a:fld id="{07220F22-952A-401A-B807-A53836ED08B8}" type="datetime1">
               <a:rPr lang="pl-PL" noProof="0" smtClean="0"/>
-              <a:t>25.11.2022</a:t>
+              <a:t>08.12.2022</a:t>
             </a:fld>
             <a:endParaRPr lang="pl-PL" noProof="0"/>
           </a:p>
@@ -3632,7 +3637,7 @@
             <a:pPr rtl="0"/>
             <a:fld id="{D57F1E4F-1CFF-5643-939E-217C01CDF565}" type="slidenum">
               <a:rPr lang="pl-PL" noProof="0" smtClean="0"/>
-              <a:pPr/>
+              <a:pPr rtl="0"/>
               <a:t>‹#›</a:t>
             </a:fld>
             <a:endParaRPr lang="pl-PL" noProof="0"/>
@@ -3820,7 +3825,7 @@
           <a:p>
             <a:pPr lvl="0" rtl="0"/>
             <a:r>
-              <a:rPr lang="pl-PL" noProof="0" dirty="0"/>
+              <a:rPr lang="pl-PL" noProof="0"/>
               <a:t>Kliknij, aby edytować style wzorca tekstu</a:t>
             </a:r>
           </a:p>
@@ -3844,7 +3849,7 @@
             <a:pPr rtl="0"/>
             <a:fld id="{F831B16C-5992-4FEE-A984-C59B4C8C045B}" type="datetime1">
               <a:rPr lang="pl-PL" noProof="0" smtClean="0"/>
-              <a:t>25.11.2022</a:t>
+              <a:t>08.12.2022</a:t>
             </a:fld>
             <a:endParaRPr lang="pl-PL" noProof="0"/>
           </a:p>
@@ -3888,7 +3893,7 @@
             <a:pPr rtl="0"/>
             <a:fld id="{D57F1E4F-1CFF-5643-939E-217C01CDF565}" type="slidenum">
               <a:rPr lang="pl-PL" noProof="0" smtClean="0"/>
-              <a:pPr/>
+              <a:pPr rtl="0"/>
               <a:t>‹#›</a:t>
             </a:fld>
             <a:endParaRPr lang="pl-PL" noProof="0"/>
@@ -3995,35 +4000,35 @@
           <a:p>
             <a:pPr lvl="0" rtl="0"/>
             <a:r>
-              <a:rPr lang="pl-PL" noProof="0" dirty="0"/>
+              <a:rPr lang="pl-PL" noProof="0"/>
               <a:t>Kliknij, aby edytować style wzorca tekstu</a:t>
             </a:r>
           </a:p>
           <a:p>
             <a:pPr lvl="1" rtl="0"/>
             <a:r>
-              <a:rPr lang="pl-PL" noProof="0" dirty="0"/>
+              <a:rPr lang="pl-PL" noProof="0"/>
               <a:t>Drugi poziom</a:t>
             </a:r>
           </a:p>
           <a:p>
             <a:pPr lvl="2" rtl="0"/>
             <a:r>
-              <a:rPr lang="pl-PL" noProof="0" dirty="0"/>
+              <a:rPr lang="pl-PL" noProof="0"/>
               <a:t>Trzeci poziom</a:t>
             </a:r>
           </a:p>
           <a:p>
             <a:pPr lvl="3" rtl="0"/>
             <a:r>
-              <a:rPr lang="pl-PL" noProof="0" dirty="0"/>
+              <a:rPr lang="pl-PL" noProof="0"/>
               <a:t>Czwarty poziom</a:t>
             </a:r>
           </a:p>
           <a:p>
             <a:pPr lvl="4" rtl="0"/>
             <a:r>
-              <a:rPr lang="pl-PL" noProof="0" dirty="0"/>
+              <a:rPr lang="pl-PL" noProof="0"/>
               <a:t>Piąty poziom</a:t>
             </a:r>
           </a:p>
@@ -4081,35 +4086,35 @@
           <a:p>
             <a:pPr lvl="0" rtl="0"/>
             <a:r>
-              <a:rPr lang="pl-PL" noProof="0" dirty="0"/>
+              <a:rPr lang="pl-PL" noProof="0"/>
               <a:t>Kliknij, aby edytować style wzorca tekstu</a:t>
             </a:r>
           </a:p>
           <a:p>
             <a:pPr lvl="1" rtl="0"/>
             <a:r>
-              <a:rPr lang="pl-PL" noProof="0" dirty="0"/>
+              <a:rPr lang="pl-PL" noProof="0"/>
               <a:t>Drugi poziom</a:t>
             </a:r>
           </a:p>
           <a:p>
             <a:pPr lvl="2" rtl="0"/>
             <a:r>
-              <a:rPr lang="pl-PL" noProof="0" dirty="0"/>
+              <a:rPr lang="pl-PL" noProof="0"/>
               <a:t>Trzeci poziom</a:t>
             </a:r>
           </a:p>
           <a:p>
             <a:pPr lvl="3" rtl="0"/>
             <a:r>
-              <a:rPr lang="pl-PL" noProof="0" dirty="0"/>
+              <a:rPr lang="pl-PL" noProof="0"/>
               <a:t>Czwarty poziom</a:t>
             </a:r>
           </a:p>
           <a:p>
             <a:pPr lvl="4" rtl="0"/>
             <a:r>
-              <a:rPr lang="pl-PL" noProof="0" dirty="0"/>
+              <a:rPr lang="pl-PL" noProof="0"/>
               <a:t>Piąty poziom</a:t>
             </a:r>
           </a:p>
@@ -4133,7 +4138,7 @@
             <a:pPr rtl="0"/>
             <a:fld id="{D287D7A7-A5DD-42C2-A317-45EA5ACFDAA6}" type="datetime1">
               <a:rPr lang="pl-PL" noProof="0" smtClean="0"/>
-              <a:t>25.11.2022</a:t>
+              <a:t>08.12.2022</a:t>
             </a:fld>
             <a:endParaRPr lang="pl-PL" noProof="0"/>
           </a:p>
@@ -4177,7 +4182,7 @@
             <a:pPr rtl="0"/>
             <a:fld id="{D57F1E4F-1CFF-5643-939E-217C01CDF565}" type="slidenum">
               <a:rPr lang="pl-PL" noProof="0" smtClean="0"/>
-              <a:pPr/>
+              <a:pPr rtl="0"/>
               <a:t>‹#›</a:t>
             </a:fld>
             <a:endParaRPr lang="pl-PL" noProof="0"/>
@@ -4297,7 +4302,7 @@
           <a:p>
             <a:pPr lvl="0" rtl="0"/>
             <a:r>
-              <a:rPr lang="pl-PL" noProof="0" dirty="0"/>
+              <a:rPr lang="pl-PL" noProof="0"/>
               <a:t>Kliknij, aby edytować style wzorca tekstu</a:t>
             </a:r>
           </a:p>
@@ -4355,35 +4360,35 @@
           <a:p>
             <a:pPr lvl="0" rtl="0"/>
             <a:r>
-              <a:rPr lang="pl-PL" noProof="0" dirty="0"/>
+              <a:rPr lang="pl-PL" noProof="0"/>
               <a:t>Kliknij, aby edytować style wzorca tekstu</a:t>
             </a:r>
           </a:p>
           <a:p>
             <a:pPr lvl="1" rtl="0"/>
             <a:r>
-              <a:rPr lang="pl-PL" noProof="0" dirty="0"/>
+              <a:rPr lang="pl-PL" noProof="0"/>
               <a:t>Drugi poziom</a:t>
             </a:r>
           </a:p>
           <a:p>
             <a:pPr lvl="2" rtl="0"/>
             <a:r>
-              <a:rPr lang="pl-PL" noProof="0" dirty="0"/>
+              <a:rPr lang="pl-PL" noProof="0"/>
               <a:t>Trzeci poziom</a:t>
             </a:r>
           </a:p>
           <a:p>
             <a:pPr lvl="3" rtl="0"/>
             <a:r>
-              <a:rPr lang="pl-PL" noProof="0" dirty="0"/>
+              <a:rPr lang="pl-PL" noProof="0"/>
               <a:t>Czwarty poziom</a:t>
             </a:r>
           </a:p>
           <a:p>
             <a:pPr lvl="4" rtl="0"/>
             <a:r>
-              <a:rPr lang="pl-PL" noProof="0" dirty="0"/>
+              <a:rPr lang="pl-PL" noProof="0"/>
               <a:t>Piąty poziom</a:t>
             </a:r>
           </a:p>
@@ -4450,7 +4455,7 @@
           <a:p>
             <a:pPr lvl="0" rtl="0"/>
             <a:r>
-              <a:rPr lang="pl-PL" noProof="0" dirty="0"/>
+              <a:rPr lang="pl-PL" noProof="0"/>
               <a:t>Kliknij, aby edytować style wzorca tekstu</a:t>
             </a:r>
           </a:p>
@@ -4508,35 +4513,35 @@
           <a:p>
             <a:pPr lvl="0" rtl="0"/>
             <a:r>
-              <a:rPr lang="pl-PL" noProof="0" dirty="0"/>
+              <a:rPr lang="pl-PL" noProof="0"/>
               <a:t>Kliknij, aby edytować style wzorca tekstu</a:t>
             </a:r>
           </a:p>
           <a:p>
             <a:pPr lvl="1" rtl="0"/>
             <a:r>
-              <a:rPr lang="pl-PL" noProof="0" dirty="0"/>
+              <a:rPr lang="pl-PL" noProof="0"/>
               <a:t>Drugi poziom</a:t>
             </a:r>
           </a:p>
           <a:p>
             <a:pPr lvl="2" rtl="0"/>
             <a:r>
-              <a:rPr lang="pl-PL" noProof="0" dirty="0"/>
+              <a:rPr lang="pl-PL" noProof="0"/>
               <a:t>Trzeci poziom</a:t>
             </a:r>
           </a:p>
           <a:p>
             <a:pPr lvl="3" rtl="0"/>
             <a:r>
-              <a:rPr lang="pl-PL" noProof="0" dirty="0"/>
+              <a:rPr lang="pl-PL" noProof="0"/>
               <a:t>Czwarty poziom</a:t>
             </a:r>
           </a:p>
           <a:p>
             <a:pPr lvl="4" rtl="0"/>
             <a:r>
-              <a:rPr lang="pl-PL" noProof="0" dirty="0"/>
+              <a:rPr lang="pl-PL" noProof="0"/>
               <a:t>Piąty poziom</a:t>
             </a:r>
           </a:p>
@@ -4560,7 +4565,7 @@
             <a:pPr rtl="0"/>
             <a:fld id="{4D205B3A-3185-49DD-88B2-6BC971630033}" type="datetime1">
               <a:rPr lang="pl-PL" noProof="0" smtClean="0"/>
-              <a:t>25.11.2022</a:t>
+              <a:t>08.12.2022</a:t>
             </a:fld>
             <a:endParaRPr lang="pl-PL" noProof="0"/>
           </a:p>
@@ -4604,7 +4609,7 @@
             <a:pPr rtl="0"/>
             <a:fld id="{D57F1E4F-1CFF-5643-939E-217C01CDF565}" type="slidenum">
               <a:rPr lang="pl-PL" noProof="0" smtClean="0"/>
-              <a:pPr/>
+              <a:pPr rtl="0"/>
               <a:t>‹#›</a:t>
             </a:fld>
             <a:endParaRPr lang="pl-PL" noProof="0"/>
@@ -4677,7 +4682,7 @@
             <a:pPr rtl="0"/>
             <a:fld id="{DA039FD8-7017-4517-B835-3E3E65075EDC}" type="datetime1">
               <a:rPr lang="pl-PL" noProof="0" smtClean="0"/>
-              <a:t>25.11.2022</a:t>
+              <a:t>08.12.2022</a:t>
             </a:fld>
             <a:endParaRPr lang="pl-PL" noProof="0"/>
           </a:p>
@@ -4721,7 +4726,7 @@
             <a:pPr rtl="0"/>
             <a:fld id="{D57F1E4F-1CFF-5643-939E-217C01CDF565}" type="slidenum">
               <a:rPr lang="pl-PL" noProof="0" smtClean="0"/>
-              <a:pPr/>
+              <a:pPr rtl="0"/>
               <a:t>‹#›</a:t>
             </a:fld>
             <a:endParaRPr lang="pl-PL" noProof="0"/>
@@ -4771,7 +4776,7 @@
             <a:pPr rtl="0"/>
             <a:fld id="{2736CFA6-6FA1-4AAB-95FB-A27B5D34D93B}" type="datetime1">
               <a:rPr lang="pl-PL" noProof="0" smtClean="0"/>
-              <a:t>25.11.2022</a:t>
+              <a:t>08.12.2022</a:t>
             </a:fld>
             <a:endParaRPr lang="pl-PL" noProof="0"/>
           </a:p>
@@ -4815,7 +4820,7 @@
             <a:pPr rtl="0"/>
             <a:fld id="{D57F1E4F-1CFF-5643-939E-217C01CDF565}" type="slidenum">
               <a:rPr lang="pl-PL" noProof="0" smtClean="0"/>
-              <a:pPr/>
+              <a:pPr rtl="0"/>
               <a:t>‹#›</a:t>
             </a:fld>
             <a:endParaRPr lang="pl-PL" noProof="0"/>
@@ -4933,35 +4938,35 @@
           <a:p>
             <a:pPr lvl="0" rtl="0"/>
             <a:r>
-              <a:rPr lang="pl-PL" noProof="0" dirty="0"/>
+              <a:rPr lang="pl-PL" noProof="0"/>
               <a:t>Kliknij, aby edytować style wzorca tekstu</a:t>
             </a:r>
           </a:p>
           <a:p>
             <a:pPr lvl="1" rtl="0"/>
             <a:r>
-              <a:rPr lang="pl-PL" noProof="0" dirty="0"/>
+              <a:rPr lang="pl-PL" noProof="0"/>
               <a:t>Drugi poziom</a:t>
             </a:r>
           </a:p>
           <a:p>
             <a:pPr lvl="2" rtl="0"/>
             <a:r>
-              <a:rPr lang="pl-PL" noProof="0" dirty="0"/>
+              <a:rPr lang="pl-PL" noProof="0"/>
               <a:t>Trzeci poziom</a:t>
             </a:r>
           </a:p>
           <a:p>
             <a:pPr lvl="3" rtl="0"/>
             <a:r>
-              <a:rPr lang="pl-PL" noProof="0" dirty="0"/>
+              <a:rPr lang="pl-PL" noProof="0"/>
               <a:t>Czwarty poziom</a:t>
             </a:r>
           </a:p>
           <a:p>
             <a:pPr lvl="4" rtl="0"/>
             <a:r>
-              <a:rPr lang="pl-PL" noProof="0" dirty="0"/>
+              <a:rPr lang="pl-PL" noProof="0"/>
               <a:t>Piąty poziom</a:t>
             </a:r>
           </a:p>
@@ -5028,7 +5033,7 @@
           <a:p>
             <a:pPr lvl="0" rtl="0"/>
             <a:r>
-              <a:rPr lang="pl-PL" noProof="0" dirty="0"/>
+              <a:rPr lang="pl-PL" noProof="0"/>
               <a:t>Kliknij, aby edytować style wzorca tekstu</a:t>
             </a:r>
           </a:p>
@@ -5052,7 +5057,7 @@
             <a:pPr rtl="0"/>
             <a:fld id="{6E788164-A012-40AD-9DFC-ED2754110823}" type="datetime1">
               <a:rPr lang="pl-PL" noProof="0" smtClean="0"/>
-              <a:t>25.11.2022</a:t>
+              <a:t>08.12.2022</a:t>
             </a:fld>
             <a:endParaRPr lang="pl-PL" noProof="0"/>
           </a:p>
@@ -5096,7 +5101,7 @@
             <a:pPr rtl="0"/>
             <a:fld id="{D57F1E4F-1CFF-5643-939E-217C01CDF565}" type="slidenum">
               <a:rPr lang="pl-PL" noProof="0" smtClean="0"/>
-              <a:pPr/>
+              <a:pPr rtl="0"/>
               <a:t>‹#›</a:t>
             </a:fld>
             <a:endParaRPr lang="pl-PL" noProof="0"/>
@@ -5313,7 +5318,7 @@
           <a:p>
             <a:pPr lvl="0" rtl="0"/>
             <a:r>
-              <a:rPr lang="pl-PL" noProof="0" dirty="0"/>
+              <a:rPr lang="pl-PL" noProof="0"/>
               <a:t>Kliknij, aby edytować style wzorca tekstu</a:t>
             </a:r>
           </a:p>
@@ -5342,7 +5347,7 @@
             <a:pPr rtl="0"/>
             <a:fld id="{DE56B0EC-C1F0-4CCD-9692-2285687DB711}" type="datetime1">
               <a:rPr lang="pl-PL" noProof="0" smtClean="0"/>
-              <a:t>25.11.2022</a:t>
+              <a:t>08.12.2022</a:t>
             </a:fld>
             <a:endParaRPr lang="pl-PL" noProof="0"/>
           </a:p>
@@ -5396,7 +5401,7 @@
             <a:pPr rtl="0"/>
             <a:fld id="{D57F1E4F-1CFF-5643-939E-217C01CDF565}" type="slidenum">
               <a:rPr lang="pl-PL" noProof="0" smtClean="0"/>
-              <a:pPr/>
+              <a:pPr rtl="0"/>
               <a:t>‹#›</a:t>
             </a:fld>
             <a:endParaRPr lang="pl-PL" noProof="0"/>
@@ -5493,35 +5498,35 @@
           <a:p>
             <a:pPr lvl="0" rtl="0"/>
             <a:r>
-              <a:rPr lang="pl-PL" noProof="0" dirty="0"/>
+              <a:rPr lang="pl-PL" noProof="0"/>
               <a:t>Kliknij, aby edytować style wzorca tekstu</a:t>
             </a:r>
           </a:p>
           <a:p>
             <a:pPr lvl="1" rtl="0"/>
             <a:r>
-              <a:rPr lang="pl-PL" noProof="0" dirty="0"/>
+              <a:rPr lang="pl-PL" noProof="0"/>
               <a:t>Drugi poziom</a:t>
             </a:r>
           </a:p>
           <a:p>
             <a:pPr lvl="2" rtl="0"/>
             <a:r>
-              <a:rPr lang="pl-PL" noProof="0" dirty="0"/>
+              <a:rPr lang="pl-PL" noProof="0"/>
               <a:t>Trzeci poziom</a:t>
             </a:r>
           </a:p>
           <a:p>
             <a:pPr lvl="3" rtl="0"/>
             <a:r>
-              <a:rPr lang="pl-PL" noProof="0" dirty="0"/>
+              <a:rPr lang="pl-PL" noProof="0"/>
               <a:t>Czwarty poziom</a:t>
             </a:r>
           </a:p>
           <a:p>
             <a:pPr lvl="4" rtl="0"/>
             <a:r>
-              <a:rPr lang="pl-PL" noProof="0" dirty="0"/>
+              <a:rPr lang="pl-PL" noProof="0"/>
               <a:t>Piąty poziom</a:t>
             </a:r>
           </a:p>
@@ -5571,7 +5576,7 @@
             <a:pPr rtl="0"/>
             <a:fld id="{B7D27110-8AC1-4DC9-9373-45604EBA8C0E}" type="datetime1">
               <a:rPr lang="pl-PL" noProof="0" smtClean="0"/>
-              <a:t>25.11.2022</a:t>
+              <a:t>08.12.2022</a:t>
             </a:fld>
             <a:endParaRPr lang="pl-PL" noProof="0"/>
           </a:p>
@@ -5667,7 +5672,7 @@
             <a:pPr rtl="0"/>
             <a:fld id="{D57F1E4F-1CFF-5643-939E-217C01CDF565}" type="slidenum">
               <a:rPr lang="pl-PL" noProof="0" smtClean="0"/>
-              <a:pPr/>
+              <a:pPr rtl="0"/>
               <a:t>‹#›</a:t>
             </a:fld>
             <a:endParaRPr lang="pl-PL" noProof="0"/>
@@ -6362,7 +6367,7 @@
           <a:lstStyle/>
           <a:p>
             <a:r>
-              <a:rPr lang="pl-PL" dirty="0">
+              <a:rPr lang="pl-PL">
                 <a:effectLst>
                   <a:glow rad="38100">
                     <a:prstClr val="black">
@@ -6382,7 +6387,7 @@
               </a:rPr>
               <a:t>problemy programistyczne w kontekście obiektowym</a:t>
             </a:r>
-            <a:endParaRPr lang="pl-PL" dirty="0"/>
+            <a:endParaRPr lang="pl-PL"/>
           </a:p>
         </p:txBody>
       </p:sp>
@@ -6421,7 +6426,7 @@
           <p:cNvPr id="2" name="Tytuł 1">
             <a:extLst>
               <a:ext uri="{FF2B5EF4-FFF2-40B4-BE49-F238E27FC236}">
-                <a16:creationId xmlns:a16="http://schemas.microsoft.com/office/drawing/2014/main" id="{F7DF55FB-10CA-654E-4A6C-E53302249C20}"/>
+                <a16:creationId xmlns:a16="http://schemas.microsoft.com/office/drawing/2014/main" id="{905F9531-A09B-BF56-09D6-62C8C6F668C8}"/>
               </a:ext>
             </a:extLst>
           </p:cNvPr>
@@ -6454,7 +6459,7 @@
                   </a:outerShdw>
                 </a:effectLst>
               </a:rPr>
-              <a:t>Przykład</a:t>
+              <a:t>Co to programowanie obiektowe</a:t>
             </a:r>
             <a:endParaRPr lang="pl-PL" dirty="0"/>
           </a:p>
@@ -6465,7 +6470,7 @@
           <p:cNvPr id="3" name="Symbol zastępczy zawartości 2">
             <a:extLst>
               <a:ext uri="{FF2B5EF4-FFF2-40B4-BE49-F238E27FC236}">
-                <a16:creationId xmlns:a16="http://schemas.microsoft.com/office/drawing/2014/main" id="{0C66F468-62B7-3B86-5049-6AC5F83BBB34}"/>
+                <a16:creationId xmlns:a16="http://schemas.microsoft.com/office/drawing/2014/main" id="{1D8D961D-0F76-9DAD-1206-98DC63521A2B}"/>
               </a:ext>
             </a:extLst>
           </p:cNvPr>
@@ -6476,19 +6481,45 @@
             <p:ph idx="1"/>
           </p:nvPr>
         </p:nvSpPr>
-        <p:spPr/>
+        <p:spPr>
+          <a:xfrm>
+            <a:off x="746642" y="2666999"/>
+            <a:ext cx="10860793" cy="3124201"/>
+          </a:xfrm>
+        </p:spPr>
         <p:txBody>
           <a:bodyPr/>
           <a:lstStyle/>
           <a:p>
-            <a:endParaRPr lang="pl-PL"/>
+            <a:pPr marL="0" indent="0">
+              <a:buNone/>
+            </a:pPr>
+            <a:r>
+              <a:rPr lang="pl-PL" sz="2800" dirty="0">
+                <a:effectLst>
+                  <a:glow rad="38100">
+                    <a:prstClr val="black">
+                      <a:lumMod val="50000"/>
+                      <a:lumOff val="50000"/>
+                      <a:alpha val="20000"/>
+                    </a:prstClr>
+                  </a:glow>
+                  <a:outerShdw blurRad="44450" dist="12700" dir="13860000" algn="tl" rotWithShape="0">
+                    <a:srgbClr val="000000">
+                      <a:alpha val="20000"/>
+                    </a:srgbClr>
+                  </a:outerShdw>
+                </a:effectLst>
+              </a:rPr>
+              <a:t>Programowanie obiektowe paradygmat programowania opierający się na obiektach. Dane przechowywane są w nim w formie pól (określanych też jako atrybuty lub właściwości) a kod przechowywany jest w formie metod.</a:t>
+            </a:r>
           </a:p>
         </p:txBody>
       </p:sp>
     </p:spTree>
     <p:extLst>
       <p:ext uri="{BB962C8B-B14F-4D97-AF65-F5344CB8AC3E}">
-        <p14:creationId xmlns:p14="http://schemas.microsoft.com/office/powerpoint/2010/main" val="966392034"/>
+        <p14:creationId xmlns:p14="http://schemas.microsoft.com/office/powerpoint/2010/main" val="256326190"/>
       </p:ext>
     </p:extLst>
   </p:cSld>
@@ -6537,7 +6568,7 @@
           <a:lstStyle/>
           <a:p>
             <a:r>
-              <a:rPr lang="pl-PL" dirty="0">
+              <a:rPr lang="pl-PL">
                 <a:effectLst>
                   <a:glow rad="38100">
                     <a:prstClr val="black">
@@ -6555,7 +6586,7 @@
               </a:rPr>
               <a:t>Zalety podejścia obiektowego</a:t>
             </a:r>
-            <a:endParaRPr lang="pl-PL" dirty="0"/>
+            <a:endParaRPr lang="pl-PL"/>
           </a:p>
         </p:txBody>
       </p:sp>
@@ -6581,7 +6612,7 @@
           <a:lstStyle/>
           <a:p>
             <a:r>
-              <a:rPr lang="pl-PL" sz="3200" dirty="0">
+              <a:rPr lang="pl-PL" sz="3200">
                 <a:effectLst>
                   <a:glow rad="38100">
                     <a:prstClr val="black">
@@ -6607,7 +6638,7 @@
               </a:buClr>
             </a:pPr>
             <a:r>
-              <a:rPr lang="pl-PL" sz="3200" dirty="0">
+              <a:rPr lang="pl-PL" sz="3200">
                 <a:effectLst>
                   <a:glow rad="38100">
                     <a:prstClr val="black">
@@ -6633,7 +6664,7 @@
               </a:buClr>
             </a:pPr>
             <a:r>
-              <a:rPr lang="pl-PL" sz="3200" dirty="0">
+              <a:rPr lang="pl-PL" sz="3200">
                 <a:effectLst>
                   <a:glow rad="38100">
                     <a:prstClr val="black">
@@ -6659,7 +6690,7 @@
               </a:buClr>
             </a:pPr>
             <a:r>
-              <a:rPr lang="pl-PL" sz="3200" dirty="0">
+              <a:rPr lang="pl-PL" sz="3200">
                 <a:effectLst>
                   <a:glow rad="38100">
                     <a:prstClr val="black">
@@ -6715,6 +6746,634 @@
           <p:cNvPr id="2" name="Tytuł 1">
             <a:extLst>
               <a:ext uri="{FF2B5EF4-FFF2-40B4-BE49-F238E27FC236}">
+                <a16:creationId xmlns:a16="http://schemas.microsoft.com/office/drawing/2014/main" id="{667E5448-1A55-FD5B-AC33-64F27917A1A4}"/>
+              </a:ext>
+            </a:extLst>
+          </p:cNvPr>
+          <p:cNvSpPr>
+            <a:spLocks noGrp="1"/>
+          </p:cNvSpPr>
+          <p:nvPr>
+            <p:ph type="title"/>
+          </p:nvPr>
+        </p:nvSpPr>
+        <p:spPr/>
+        <p:txBody>
+          <a:bodyPr/>
+          <a:lstStyle/>
+          <a:p>
+            <a:r>
+              <a:rPr lang="pl-PL">
+                <a:effectLst>
+                  <a:glow rad="38100">
+                    <a:prstClr val="black">
+                      <a:lumMod val="65000"/>
+                      <a:lumOff val="35000"/>
+                      <a:alpha val="40000"/>
+                    </a:prstClr>
+                  </a:glow>
+                  <a:outerShdw blurRad="28575" dist="38100" dir="14040000" algn="tl" rotWithShape="0">
+                    <a:srgbClr val="000000">
+                      <a:alpha val="25000"/>
+                    </a:srgbClr>
+                  </a:outerShdw>
+                </a:effectLst>
+              </a:rPr>
+              <a:t>Cechy charakterystyczne dla programowania obiektowego</a:t>
+            </a:r>
+            <a:endParaRPr lang="pl-PL"/>
+          </a:p>
+        </p:txBody>
+      </p:sp>
+      <p:sp>
+        <p:nvSpPr>
+          <p:cNvPr id="7" name="Symbol zastępczy zawartości 2">
+            <a:extLst>
+              <a:ext uri="{FF2B5EF4-FFF2-40B4-BE49-F238E27FC236}">
+                <a16:creationId xmlns:a16="http://schemas.microsoft.com/office/drawing/2014/main" id="{33E9954E-29DC-9BF3-8DA9-4509E8ABD335}"/>
+              </a:ext>
+            </a:extLst>
+          </p:cNvPr>
+          <p:cNvSpPr txBox="1">
+            <a:spLocks/>
+          </p:cNvSpPr>
+          <p:nvPr/>
+        </p:nvSpPr>
+        <p:spPr>
+          <a:xfrm>
+            <a:off x="1139484" y="2549323"/>
+            <a:ext cx="9905998" cy="3124201"/>
+          </a:xfrm>
+          <a:prstGeom prst="rect">
+            <a:avLst/>
+          </a:prstGeom>
+        </p:spPr>
+        <p:txBody>
+          <a:bodyPr vert="horz" lIns="91440" tIns="45720" rIns="91440" bIns="45720" rtlCol="0" anchor="ctr">
+            <a:normAutofit/>
+          </a:bodyPr>
+          <a:lstStyle>
+            <a:lvl1pPr marL="285750" indent="-285750" algn="l" defTabSz="457200" rtl="0" eaLnBrk="1" latinLnBrk="0" hangingPunct="1">
+              <a:spcBef>
+                <a:spcPct val="20000"/>
+              </a:spcBef>
+              <a:spcAft>
+                <a:spcPts val="600"/>
+              </a:spcAft>
+              <a:buClr>
+                <a:schemeClr val="tx1"/>
+              </a:buClr>
+              <a:buSzPct val="100000"/>
+              <a:buFont typeface="Arial"/>
+              <a:buChar char="•"/>
+              <a:defRPr sz="2000" kern="1200" cap="small">
+                <a:gradFill flip="none" rotWithShape="1">
+                  <a:gsLst>
+                    <a:gs pos="0">
+                      <a:schemeClr val="tx1"/>
+                    </a:gs>
+                    <a:gs pos="100000">
+                      <a:schemeClr val="tx1">
+                        <a:lumMod val="75000"/>
+                      </a:schemeClr>
+                    </a:gs>
+                  </a:gsLst>
+                  <a:lin ang="5580000" scaled="0"/>
+                  <a:tileRect/>
+                </a:gradFill>
+                <a:effectLst>
+                  <a:glow rad="38100">
+                    <a:schemeClr val="bg1">
+                      <a:lumMod val="50000"/>
+                      <a:lumOff val="50000"/>
+                      <a:alpha val="20000"/>
+                    </a:schemeClr>
+                  </a:glow>
+                  <a:outerShdw blurRad="44450" dist="12700" dir="13860000" algn="tl" rotWithShape="0">
+                    <a:srgbClr val="000000">
+                      <a:alpha val="20000"/>
+                    </a:srgbClr>
+                  </a:outerShdw>
+                </a:effectLst>
+                <a:latin typeface="+mn-lt"/>
+                <a:ea typeface="+mn-ea"/>
+                <a:cs typeface="+mn-cs"/>
+              </a:defRPr>
+            </a:lvl1pPr>
+            <a:lvl2pPr marL="742950" indent="-285750" algn="l" defTabSz="457200" rtl="0" eaLnBrk="1" latinLnBrk="0" hangingPunct="1">
+              <a:spcBef>
+                <a:spcPct val="20000"/>
+              </a:spcBef>
+              <a:spcAft>
+                <a:spcPts val="600"/>
+              </a:spcAft>
+              <a:buClr>
+                <a:schemeClr val="tx1"/>
+              </a:buClr>
+              <a:buSzPct val="100000"/>
+              <a:buFont typeface="Arial"/>
+              <a:buChar char="•"/>
+              <a:defRPr sz="1800" kern="1200" cap="small">
+                <a:gradFill flip="none" rotWithShape="1">
+                  <a:gsLst>
+                    <a:gs pos="0">
+                      <a:schemeClr val="tx1"/>
+                    </a:gs>
+                    <a:gs pos="100000">
+                      <a:schemeClr val="tx1">
+                        <a:lumMod val="75000"/>
+                      </a:schemeClr>
+                    </a:gs>
+                  </a:gsLst>
+                  <a:lin ang="5580000" scaled="0"/>
+                  <a:tileRect/>
+                </a:gradFill>
+                <a:effectLst>
+                  <a:glow rad="38100">
+                    <a:schemeClr val="bg1">
+                      <a:lumMod val="50000"/>
+                      <a:lumOff val="50000"/>
+                      <a:alpha val="20000"/>
+                    </a:schemeClr>
+                  </a:glow>
+                  <a:outerShdw blurRad="44450" dist="12700" dir="13860000" algn="tl" rotWithShape="0">
+                    <a:srgbClr val="000000">
+                      <a:alpha val="20000"/>
+                    </a:srgbClr>
+                  </a:outerShdw>
+                </a:effectLst>
+                <a:latin typeface="+mn-lt"/>
+                <a:ea typeface="+mn-ea"/>
+                <a:cs typeface="+mn-cs"/>
+              </a:defRPr>
+            </a:lvl2pPr>
+            <a:lvl3pPr marL="1200150" indent="-285750" algn="l" defTabSz="457200" rtl="0" eaLnBrk="1" latinLnBrk="0" hangingPunct="1">
+              <a:spcBef>
+                <a:spcPct val="20000"/>
+              </a:spcBef>
+              <a:spcAft>
+                <a:spcPts val="600"/>
+              </a:spcAft>
+              <a:buClr>
+                <a:schemeClr val="tx1"/>
+              </a:buClr>
+              <a:buSzPct val="100000"/>
+              <a:buFont typeface="Arial"/>
+              <a:buChar char="•"/>
+              <a:defRPr sz="1600" kern="1200" cap="small">
+                <a:gradFill flip="none" rotWithShape="1">
+                  <a:gsLst>
+                    <a:gs pos="0">
+                      <a:schemeClr val="tx1"/>
+                    </a:gs>
+                    <a:gs pos="100000">
+                      <a:schemeClr val="tx1">
+                        <a:lumMod val="75000"/>
+                      </a:schemeClr>
+                    </a:gs>
+                  </a:gsLst>
+                  <a:lin ang="5580000" scaled="0"/>
+                  <a:tileRect/>
+                </a:gradFill>
+                <a:effectLst>
+                  <a:glow rad="38100">
+                    <a:schemeClr val="bg1">
+                      <a:lumMod val="50000"/>
+                      <a:lumOff val="50000"/>
+                      <a:alpha val="20000"/>
+                    </a:schemeClr>
+                  </a:glow>
+                  <a:outerShdw blurRad="44450" dist="12700" dir="13860000" algn="tl" rotWithShape="0">
+                    <a:srgbClr val="000000">
+                      <a:alpha val="20000"/>
+                    </a:srgbClr>
+                  </a:outerShdw>
+                </a:effectLst>
+                <a:latin typeface="+mn-lt"/>
+                <a:ea typeface="+mn-ea"/>
+                <a:cs typeface="+mn-cs"/>
+              </a:defRPr>
+            </a:lvl3pPr>
+            <a:lvl4pPr marL="1543050" indent="-171450" algn="l" defTabSz="457200" rtl="0" eaLnBrk="1" latinLnBrk="0" hangingPunct="1">
+              <a:spcBef>
+                <a:spcPct val="20000"/>
+              </a:spcBef>
+              <a:spcAft>
+                <a:spcPts val="600"/>
+              </a:spcAft>
+              <a:buClr>
+                <a:schemeClr val="tx1"/>
+              </a:buClr>
+              <a:buSzPct val="100000"/>
+              <a:buFont typeface="Arial"/>
+              <a:buChar char="•"/>
+              <a:defRPr sz="1400" kern="1200" cap="small">
+                <a:gradFill flip="none" rotWithShape="1">
+                  <a:gsLst>
+                    <a:gs pos="0">
+                      <a:schemeClr val="tx1"/>
+                    </a:gs>
+                    <a:gs pos="100000">
+                      <a:schemeClr val="tx1">
+                        <a:lumMod val="75000"/>
+                      </a:schemeClr>
+                    </a:gs>
+                  </a:gsLst>
+                  <a:lin ang="5580000" scaled="0"/>
+                  <a:tileRect/>
+                </a:gradFill>
+                <a:effectLst>
+                  <a:glow rad="38100">
+                    <a:schemeClr val="bg1">
+                      <a:lumMod val="50000"/>
+                      <a:lumOff val="50000"/>
+                      <a:alpha val="20000"/>
+                    </a:schemeClr>
+                  </a:glow>
+                  <a:outerShdw blurRad="44450" dist="12700" dir="13860000" algn="tl" rotWithShape="0">
+                    <a:srgbClr val="000000">
+                      <a:alpha val="20000"/>
+                    </a:srgbClr>
+                  </a:outerShdw>
+                </a:effectLst>
+                <a:latin typeface="+mn-lt"/>
+                <a:ea typeface="+mn-ea"/>
+                <a:cs typeface="+mn-cs"/>
+              </a:defRPr>
+            </a:lvl4pPr>
+            <a:lvl5pPr marL="2000250" indent="-171450" algn="l" defTabSz="457200" rtl="0" eaLnBrk="1" latinLnBrk="0" hangingPunct="1">
+              <a:spcBef>
+                <a:spcPct val="20000"/>
+              </a:spcBef>
+              <a:spcAft>
+                <a:spcPts val="600"/>
+              </a:spcAft>
+              <a:buClr>
+                <a:schemeClr val="tx1"/>
+              </a:buClr>
+              <a:buSzPct val="100000"/>
+              <a:buFont typeface="Arial"/>
+              <a:buChar char="•"/>
+              <a:defRPr sz="1400" kern="1200" cap="small">
+                <a:gradFill flip="none" rotWithShape="1">
+                  <a:gsLst>
+                    <a:gs pos="0">
+                      <a:schemeClr val="tx1"/>
+                    </a:gs>
+                    <a:gs pos="100000">
+                      <a:schemeClr val="tx1">
+                        <a:lumMod val="75000"/>
+                      </a:schemeClr>
+                    </a:gs>
+                  </a:gsLst>
+                  <a:lin ang="5580000" scaled="0"/>
+                  <a:tileRect/>
+                </a:gradFill>
+                <a:effectLst>
+                  <a:glow rad="38100">
+                    <a:schemeClr val="bg1">
+                      <a:lumMod val="50000"/>
+                      <a:lumOff val="50000"/>
+                      <a:alpha val="20000"/>
+                    </a:schemeClr>
+                  </a:glow>
+                  <a:outerShdw blurRad="44450" dist="12700" dir="13860000" algn="tl" rotWithShape="0">
+                    <a:srgbClr val="000000">
+                      <a:alpha val="20000"/>
+                    </a:srgbClr>
+                  </a:outerShdw>
+                </a:effectLst>
+                <a:latin typeface="+mn-lt"/>
+                <a:ea typeface="+mn-ea"/>
+                <a:cs typeface="+mn-cs"/>
+              </a:defRPr>
+            </a:lvl5pPr>
+            <a:lvl6pPr marL="2514600" indent="-228600" algn="l" defTabSz="457200" rtl="0" eaLnBrk="1" latinLnBrk="0" hangingPunct="1">
+              <a:spcBef>
+                <a:spcPct val="20000"/>
+              </a:spcBef>
+              <a:spcAft>
+                <a:spcPts val="600"/>
+              </a:spcAft>
+              <a:buClr>
+                <a:schemeClr val="tx1"/>
+              </a:buClr>
+              <a:buSzPct val="100000"/>
+              <a:buFont typeface="Arial"/>
+              <a:buChar char="•"/>
+              <a:defRPr sz="1200" kern="1200" cap="small">
+                <a:gradFill flip="none" rotWithShape="1">
+                  <a:gsLst>
+                    <a:gs pos="0">
+                      <a:schemeClr val="tx1"/>
+                    </a:gs>
+                    <a:gs pos="100000">
+                      <a:schemeClr val="tx1">
+                        <a:lumMod val="75000"/>
+                      </a:schemeClr>
+                    </a:gs>
+                  </a:gsLst>
+                  <a:lin ang="5580000" scaled="0"/>
+                  <a:tileRect/>
+                </a:gradFill>
+                <a:effectLst>
+                  <a:glow rad="38100">
+                    <a:schemeClr val="bg1">
+                      <a:lumMod val="50000"/>
+                      <a:lumOff val="50000"/>
+                      <a:alpha val="20000"/>
+                    </a:schemeClr>
+                  </a:glow>
+                  <a:outerShdw blurRad="44450" dist="12700" dir="13860000" algn="tl" rotWithShape="0">
+                    <a:srgbClr val="000000">
+                      <a:alpha val="20000"/>
+                    </a:srgbClr>
+                  </a:outerShdw>
+                </a:effectLst>
+                <a:latin typeface="+mn-lt"/>
+                <a:ea typeface="+mn-ea"/>
+                <a:cs typeface="+mn-cs"/>
+              </a:defRPr>
+            </a:lvl6pPr>
+            <a:lvl7pPr marL="2971800" indent="-228600" algn="l" defTabSz="457200" rtl="0" eaLnBrk="1" latinLnBrk="0" hangingPunct="1">
+              <a:spcBef>
+                <a:spcPct val="20000"/>
+              </a:spcBef>
+              <a:spcAft>
+                <a:spcPts val="600"/>
+              </a:spcAft>
+              <a:buClr>
+                <a:schemeClr val="tx1"/>
+              </a:buClr>
+              <a:buSzPct val="100000"/>
+              <a:buFont typeface="Arial"/>
+              <a:buChar char="•"/>
+              <a:defRPr sz="1200" kern="1200" cap="small">
+                <a:gradFill flip="none" rotWithShape="1">
+                  <a:gsLst>
+                    <a:gs pos="0">
+                      <a:schemeClr val="tx1"/>
+                    </a:gs>
+                    <a:gs pos="100000">
+                      <a:schemeClr val="tx1">
+                        <a:lumMod val="75000"/>
+                      </a:schemeClr>
+                    </a:gs>
+                  </a:gsLst>
+                  <a:lin ang="5580000" scaled="0"/>
+                  <a:tileRect/>
+                </a:gradFill>
+                <a:effectLst>
+                  <a:glow rad="38100">
+                    <a:schemeClr val="bg1">
+                      <a:lumMod val="50000"/>
+                      <a:lumOff val="50000"/>
+                      <a:alpha val="20000"/>
+                    </a:schemeClr>
+                  </a:glow>
+                  <a:outerShdw blurRad="44450" dist="12700" dir="13860000" algn="tl" rotWithShape="0">
+                    <a:srgbClr val="000000">
+                      <a:alpha val="20000"/>
+                    </a:srgbClr>
+                  </a:outerShdw>
+                </a:effectLst>
+                <a:latin typeface="+mn-lt"/>
+                <a:ea typeface="+mn-ea"/>
+                <a:cs typeface="+mn-cs"/>
+              </a:defRPr>
+            </a:lvl7pPr>
+            <a:lvl8pPr marL="3429000" indent="-228600" algn="l" defTabSz="457200" rtl="0" eaLnBrk="1" latinLnBrk="0" hangingPunct="1">
+              <a:spcBef>
+                <a:spcPct val="20000"/>
+              </a:spcBef>
+              <a:spcAft>
+                <a:spcPts val="600"/>
+              </a:spcAft>
+              <a:buClr>
+                <a:schemeClr val="tx1"/>
+              </a:buClr>
+              <a:buSzPct val="100000"/>
+              <a:buFont typeface="Arial"/>
+              <a:buChar char="•"/>
+              <a:defRPr sz="1200" kern="1200" cap="small">
+                <a:gradFill flip="none" rotWithShape="1">
+                  <a:gsLst>
+                    <a:gs pos="0">
+                      <a:schemeClr val="tx1"/>
+                    </a:gs>
+                    <a:gs pos="100000">
+                      <a:schemeClr val="tx1">
+                        <a:lumMod val="75000"/>
+                      </a:schemeClr>
+                    </a:gs>
+                  </a:gsLst>
+                  <a:lin ang="5580000" scaled="0"/>
+                  <a:tileRect/>
+                </a:gradFill>
+                <a:effectLst>
+                  <a:glow rad="38100">
+                    <a:schemeClr val="bg1">
+                      <a:lumMod val="50000"/>
+                      <a:lumOff val="50000"/>
+                      <a:alpha val="20000"/>
+                    </a:schemeClr>
+                  </a:glow>
+                  <a:outerShdw blurRad="44450" dist="12700" dir="13860000" algn="tl" rotWithShape="0">
+                    <a:srgbClr val="000000">
+                      <a:alpha val="20000"/>
+                    </a:srgbClr>
+                  </a:outerShdw>
+                </a:effectLst>
+                <a:latin typeface="+mn-lt"/>
+                <a:ea typeface="+mn-ea"/>
+                <a:cs typeface="+mn-cs"/>
+              </a:defRPr>
+            </a:lvl8pPr>
+            <a:lvl9pPr marL="3886200" indent="-228600" algn="l" defTabSz="457200" rtl="0" eaLnBrk="1" latinLnBrk="0" hangingPunct="1">
+              <a:spcBef>
+                <a:spcPct val="20000"/>
+              </a:spcBef>
+              <a:spcAft>
+                <a:spcPts val="600"/>
+              </a:spcAft>
+              <a:buClr>
+                <a:schemeClr val="tx1"/>
+              </a:buClr>
+              <a:buSzPct val="100000"/>
+              <a:buFont typeface="Arial"/>
+              <a:buChar char="•"/>
+              <a:defRPr sz="1200" kern="1200" cap="small">
+                <a:gradFill flip="none" rotWithShape="1">
+                  <a:gsLst>
+                    <a:gs pos="0">
+                      <a:schemeClr val="tx1"/>
+                    </a:gs>
+                    <a:gs pos="100000">
+                      <a:schemeClr val="tx1">
+                        <a:lumMod val="75000"/>
+                      </a:schemeClr>
+                    </a:gs>
+                  </a:gsLst>
+                  <a:lin ang="5580000" scaled="0"/>
+                  <a:tileRect/>
+                </a:gradFill>
+                <a:effectLst>
+                  <a:glow rad="38100">
+                    <a:schemeClr val="bg1">
+                      <a:lumMod val="50000"/>
+                      <a:lumOff val="50000"/>
+                      <a:alpha val="20000"/>
+                    </a:schemeClr>
+                  </a:glow>
+                  <a:outerShdw blurRad="44450" dist="12700" dir="13860000" algn="tl" rotWithShape="0">
+                    <a:srgbClr val="000000">
+                      <a:alpha val="20000"/>
+                    </a:srgbClr>
+                  </a:outerShdw>
+                </a:effectLst>
+                <a:latin typeface="+mn-lt"/>
+                <a:ea typeface="+mn-ea"/>
+                <a:cs typeface="+mn-cs"/>
+              </a:defRPr>
+            </a:lvl9pPr>
+          </a:lstStyle>
+          <a:p>
+            <a:r>
+              <a:rPr lang="pl-PL" sz="3200">
+                <a:effectLst>
+                  <a:glow rad="38100">
+                    <a:prstClr val="black">
+                      <a:lumMod val="50000"/>
+                      <a:lumOff val="50000"/>
+                      <a:alpha val="20000"/>
+                    </a:prstClr>
+                  </a:glow>
+                  <a:outerShdw blurRad="44450" dist="12700" dir="13860000" algn="tl" rotWithShape="0">
+                    <a:srgbClr val="000000">
+                      <a:alpha val="20000"/>
+                    </a:srgbClr>
+                  </a:outerShdw>
+                </a:effectLst>
+              </a:rPr>
+              <a:t>Abstrakcja</a:t>
+            </a:r>
+          </a:p>
+          <a:p>
+            <a:pPr>
+              <a:buClr>
+                <a:srgbClr val="FFFFFF"/>
+              </a:buClr>
+            </a:pPr>
+            <a:r>
+              <a:rPr lang="pl-PL" sz="3200">
+                <a:effectLst>
+                  <a:glow rad="38100">
+                    <a:prstClr val="black">
+                      <a:lumMod val="50000"/>
+                      <a:lumOff val="50000"/>
+                      <a:alpha val="20000"/>
+                    </a:prstClr>
+                  </a:glow>
+                  <a:outerShdw blurRad="44450" dist="12700" dir="13860000" algn="tl" rotWithShape="0">
+                    <a:srgbClr val="000000">
+                      <a:alpha val="20000"/>
+                    </a:srgbClr>
+                  </a:outerShdw>
+                </a:effectLst>
+              </a:rPr>
+              <a:t>Hermetyzacja</a:t>
+            </a:r>
+          </a:p>
+          <a:p>
+            <a:pPr>
+              <a:buClr>
+                <a:srgbClr val="FFFFFF"/>
+              </a:buClr>
+            </a:pPr>
+            <a:r>
+              <a:rPr lang="pl-PL" sz="3200">
+                <a:effectLst>
+                  <a:glow rad="38100">
+                    <a:prstClr val="black">
+                      <a:lumMod val="50000"/>
+                      <a:lumOff val="50000"/>
+                      <a:alpha val="20000"/>
+                    </a:prstClr>
+                  </a:glow>
+                  <a:outerShdw blurRad="44450" dist="12700" dir="13860000" algn="tl" rotWithShape="0">
+                    <a:srgbClr val="000000">
+                      <a:alpha val="20000"/>
+                    </a:srgbClr>
+                  </a:outerShdw>
+                </a:effectLst>
+              </a:rPr>
+              <a:t>Polimorfizm</a:t>
+            </a:r>
+          </a:p>
+          <a:p>
+            <a:pPr>
+              <a:buClr>
+                <a:srgbClr val="FFFFFF"/>
+              </a:buClr>
+            </a:pPr>
+            <a:r>
+              <a:rPr lang="pl-PL" sz="3200">
+                <a:effectLst>
+                  <a:glow rad="38100">
+                    <a:prstClr val="black">
+                      <a:lumMod val="50000"/>
+                      <a:lumOff val="50000"/>
+                      <a:alpha val="20000"/>
+                    </a:prstClr>
+                  </a:glow>
+                  <a:outerShdw blurRad="44450" dist="12700" dir="13860000" algn="tl" rotWithShape="0">
+                    <a:srgbClr val="000000">
+                      <a:alpha val="20000"/>
+                    </a:srgbClr>
+                  </a:outerShdw>
+                </a:effectLst>
+              </a:rPr>
+              <a:t>Dziedziczenie</a:t>
+            </a:r>
+            <a:endParaRPr lang="pl-PL"/>
+          </a:p>
+        </p:txBody>
+      </p:sp>
+    </p:spTree>
+    <p:extLst>
+      <p:ext uri="{BB962C8B-B14F-4D97-AF65-F5344CB8AC3E}">
+        <p14:creationId xmlns:p14="http://schemas.microsoft.com/office/powerpoint/2010/main" val="1339539477"/>
+      </p:ext>
+    </p:extLst>
+  </p:cSld>
+  <p:clrMapOvr>
+    <a:masterClrMapping/>
+  </p:clrMapOvr>
+</p:sld>
+</file>
+
+<file path=ppt/slides/slide5.xml><?xml version="1.0" encoding="utf-8"?>
+<p:sld xmlns:a="http://schemas.openxmlformats.org/drawingml/2006/main" xmlns:r="http://schemas.openxmlformats.org/officeDocument/2006/relationships" xmlns:p="http://schemas.openxmlformats.org/presentationml/2006/main">
+  <p:cSld>
+    <p:spTree>
+      <p:nvGrpSpPr>
+        <p:cNvPr id="1" name=""/>
+        <p:cNvGrpSpPr/>
+        <p:nvPr/>
+      </p:nvGrpSpPr>
+      <p:grpSpPr>
+        <a:xfrm>
+          <a:off x="0" y="0"/>
+          <a:ext cx="0" cy="0"/>
+          <a:chOff x="0" y="0"/>
+          <a:chExt cx="0" cy="0"/>
+        </a:xfrm>
+      </p:grpSpPr>
+      <p:sp>
+        <p:nvSpPr>
+          <p:cNvPr id="2" name="Tytuł 1">
+            <a:extLst>
+              <a:ext uri="{FF2B5EF4-FFF2-40B4-BE49-F238E27FC236}">
                 <a16:creationId xmlns:a16="http://schemas.microsoft.com/office/drawing/2014/main" id="{F7DF55FB-10CA-654E-4A6C-E53302249C20}"/>
               </a:ext>
             </a:extLst>
@@ -6726,11 +7385,443 @@
             <p:ph type="title"/>
           </p:nvPr>
         </p:nvSpPr>
-        <p:spPr/>
+        <p:spPr>
+          <a:xfrm>
+            <a:off x="1141413" y="86299"/>
+            <a:ext cx="9905998" cy="1905000"/>
+          </a:xfrm>
+        </p:spPr>
         <p:txBody>
           <a:bodyPr/>
           <a:lstStyle/>
           <a:p>
+            <a:r>
+              <a:rPr lang="pl-PL">
+                <a:effectLst>
+                  <a:glow rad="38100">
+                    <a:prstClr val="black">
+                      <a:lumMod val="65000"/>
+                      <a:lumOff val="35000"/>
+                      <a:alpha val="40000"/>
+                    </a:prstClr>
+                  </a:glow>
+                  <a:outerShdw blurRad="28575" dist="38100" dir="14040000" algn="tl" rotWithShape="0">
+                    <a:srgbClr val="000000">
+                      <a:alpha val="25000"/>
+                    </a:srgbClr>
+                  </a:outerShdw>
+                </a:effectLst>
+              </a:rPr>
+              <a:t>Przykład rozwiązania problemu w sposób obiektowy</a:t>
+            </a:r>
+            <a:endParaRPr lang="pl-PL"/>
+          </a:p>
+        </p:txBody>
+      </p:sp>
+      <p:pic>
+        <p:nvPicPr>
+          <p:cNvPr id="4" name="Obraz 4" descr="Obraz zawierający tekst&#10;&#10;Opis wygenerowany automatycznie">
+            <a:extLst>
+              <a:ext uri="{FF2B5EF4-FFF2-40B4-BE49-F238E27FC236}">
+                <a16:creationId xmlns:a16="http://schemas.microsoft.com/office/drawing/2014/main" id="{98B67B07-68E9-0F34-A1C6-27C4E1CFA0B4}"/>
+              </a:ext>
+            </a:extLst>
+          </p:cNvPr>
+          <p:cNvPicPr>
+            <a:picLocks noChangeAspect="1"/>
+          </p:cNvPicPr>
+          <p:nvPr/>
+        </p:nvPicPr>
+        <p:blipFill>
+          <a:blip r:embed="rId2"/>
+          <a:stretch>
+            <a:fillRect/>
+          </a:stretch>
+        </p:blipFill>
+        <p:spPr>
+          <a:xfrm>
+            <a:off x="268147" y="2734771"/>
+            <a:ext cx="5164239" cy="1195547"/>
+          </a:xfrm>
+          <a:prstGeom prst="rect">
+            <a:avLst/>
+          </a:prstGeom>
+        </p:spPr>
+      </p:pic>
+      <p:pic>
+        <p:nvPicPr>
+          <p:cNvPr id="5" name="Obraz 5" descr="Obraz zawierający tekst, urządzenie&#10;&#10;Opis wygenerowany automatycznie">
+            <a:extLst>
+              <a:ext uri="{FF2B5EF4-FFF2-40B4-BE49-F238E27FC236}">
+                <a16:creationId xmlns:a16="http://schemas.microsoft.com/office/drawing/2014/main" id="{D386C8C5-DFEF-857D-269B-C0CD95AE3FE6}"/>
+              </a:ext>
+            </a:extLst>
+          </p:cNvPr>
+          <p:cNvPicPr>
+            <a:picLocks noChangeAspect="1"/>
+          </p:cNvPicPr>
+          <p:nvPr/>
+        </p:nvPicPr>
+        <p:blipFill>
+          <a:blip r:embed="rId3"/>
+          <a:stretch>
+            <a:fillRect/>
+          </a:stretch>
+        </p:blipFill>
+        <p:spPr>
+          <a:xfrm>
+            <a:off x="6759616" y="2731252"/>
+            <a:ext cx="5038844" cy="1183294"/>
+          </a:xfrm>
+          <a:prstGeom prst="rect">
+            <a:avLst/>
+          </a:prstGeom>
+        </p:spPr>
+      </p:pic>
+      <p:sp>
+        <p:nvSpPr>
+          <p:cNvPr id="6" name="pole tekstowe 5">
+            <a:extLst>
+              <a:ext uri="{FF2B5EF4-FFF2-40B4-BE49-F238E27FC236}">
+                <a16:creationId xmlns:a16="http://schemas.microsoft.com/office/drawing/2014/main" id="{4C2D18F5-95B1-37AC-1DDA-5EEDBB68B36A}"/>
+              </a:ext>
+            </a:extLst>
+          </p:cNvPr>
+          <p:cNvSpPr txBox="1"/>
+          <p:nvPr/>
+        </p:nvSpPr>
+        <p:spPr>
+          <a:xfrm>
+            <a:off x="270076" y="4031848"/>
+            <a:ext cx="4784202" cy="369332"/>
+          </a:xfrm>
+          <a:prstGeom prst="rect">
+            <a:avLst/>
+          </a:prstGeom>
+          <a:noFill/>
+        </p:spPr>
+        <p:txBody>
+          <a:bodyPr rot="0" spcFirstLastPara="0" vertOverflow="overflow" horzOverflow="overflow" vert="horz" wrap="square" lIns="91440" tIns="45720" rIns="91440" bIns="45720" numCol="1" spcCol="0" rtlCol="0" fromWordArt="0" anchor="t" anchorCtr="0" forceAA="0" compatLnSpc="1">
+            <a:prstTxWarp prst="textNoShape">
+              <a:avLst/>
+            </a:prstTxWarp>
+            <a:spAutoFit/>
+          </a:bodyPr>
+          <a:lstStyle/>
+          <a:p>
+            <a:r>
+              <a:rPr lang="pl-PL"/>
+              <a:t>Strukturalny C</a:t>
+            </a:r>
+          </a:p>
+        </p:txBody>
+      </p:sp>
+      <p:sp>
+        <p:nvSpPr>
+          <p:cNvPr id="8" name="pole tekstowe 7">
+            <a:extLst>
+              <a:ext uri="{FF2B5EF4-FFF2-40B4-BE49-F238E27FC236}">
+                <a16:creationId xmlns:a16="http://schemas.microsoft.com/office/drawing/2014/main" id="{F44EB810-1C30-0A95-E492-4E1E35732F0C}"/>
+              </a:ext>
+            </a:extLst>
+          </p:cNvPr>
+          <p:cNvSpPr txBox="1"/>
+          <p:nvPr/>
+        </p:nvSpPr>
+        <p:spPr>
+          <a:xfrm>
+            <a:off x="6761544" y="4060784"/>
+            <a:ext cx="4784202" cy="369332"/>
+          </a:xfrm>
+          <a:prstGeom prst="rect">
+            <a:avLst/>
+          </a:prstGeom>
+          <a:noFill/>
+        </p:spPr>
+        <p:txBody>
+          <a:bodyPr rot="0" spcFirstLastPara="0" vertOverflow="overflow" horzOverflow="overflow" vert="horz" wrap="square" lIns="91440" tIns="45720" rIns="91440" bIns="45720" numCol="1" spcCol="0" rtlCol="0" fromWordArt="0" anchor="t" anchorCtr="0" forceAA="0" compatLnSpc="1">
+            <a:prstTxWarp prst="textNoShape">
+              <a:avLst/>
+            </a:prstTxWarp>
+            <a:spAutoFit/>
+          </a:bodyPr>
+          <a:lstStyle/>
+          <a:p>
+            <a:r>
+              <a:rPr lang="pl-PL"/>
+              <a:t>Obiektowy C#</a:t>
+            </a:r>
+          </a:p>
+        </p:txBody>
+      </p:sp>
+    </p:spTree>
+    <p:extLst>
+      <p:ext uri="{BB962C8B-B14F-4D97-AF65-F5344CB8AC3E}">
+        <p14:creationId xmlns:p14="http://schemas.microsoft.com/office/powerpoint/2010/main" val="966392034"/>
+      </p:ext>
+    </p:extLst>
+  </p:cSld>
+  <p:clrMapOvr>
+    <a:masterClrMapping/>
+  </p:clrMapOvr>
+</p:sld>
+</file>
+
+<file path=ppt/slides/slide6.xml><?xml version="1.0" encoding="utf-8"?>
+<p:sld xmlns:a="http://schemas.openxmlformats.org/drawingml/2006/main" xmlns:r="http://schemas.openxmlformats.org/officeDocument/2006/relationships" xmlns:p="http://schemas.openxmlformats.org/presentationml/2006/main">
+  <p:cSld>
+    <p:spTree>
+      <p:nvGrpSpPr>
+        <p:cNvPr id="1" name=""/>
+        <p:cNvGrpSpPr/>
+        <p:nvPr/>
+      </p:nvGrpSpPr>
+      <p:grpSpPr>
+        <a:xfrm>
+          <a:off x="0" y="0"/>
+          <a:ext cx="0" cy="0"/>
+          <a:chOff x="0" y="0"/>
+          <a:chExt cx="0" cy="0"/>
+        </a:xfrm>
+      </p:grpSpPr>
+      <p:sp>
+        <p:nvSpPr>
+          <p:cNvPr id="2" name="Tytuł 1">
+            <a:extLst>
+              <a:ext uri="{FF2B5EF4-FFF2-40B4-BE49-F238E27FC236}">
+                <a16:creationId xmlns:a16="http://schemas.microsoft.com/office/drawing/2014/main" id="{F7DF55FB-10CA-654E-4A6C-E53302249C20}"/>
+              </a:ext>
+            </a:extLst>
+          </p:cNvPr>
+          <p:cNvSpPr>
+            <a:spLocks noGrp="1"/>
+          </p:cNvSpPr>
+          <p:nvPr>
+            <p:ph type="title"/>
+          </p:nvPr>
+        </p:nvSpPr>
+        <p:spPr/>
+        <p:txBody>
+          <a:bodyPr/>
+          <a:lstStyle/>
+          <a:p>
+            <a:r>
+              <a:rPr lang="pl-PL">
+                <a:effectLst>
+                  <a:glow rad="38100">
+                    <a:prstClr val="black">
+                      <a:lumMod val="65000"/>
+                      <a:lumOff val="35000"/>
+                      <a:alpha val="40000"/>
+                    </a:prstClr>
+                  </a:glow>
+                  <a:outerShdw blurRad="28575" dist="38100" dir="14040000" algn="tl" rotWithShape="0">
+                    <a:srgbClr val="000000">
+                      <a:alpha val="25000"/>
+                    </a:srgbClr>
+                  </a:outerShdw>
+                </a:effectLst>
+              </a:rPr>
+              <a:t>Przykłady Języków bazujących na podejściu obiektowym</a:t>
+            </a:r>
+            <a:endParaRPr lang="pl-PL"/>
+          </a:p>
+        </p:txBody>
+      </p:sp>
+      <p:sp>
+        <p:nvSpPr>
+          <p:cNvPr id="3" name="Symbol zastępczy zawartości 2">
+            <a:extLst>
+              <a:ext uri="{FF2B5EF4-FFF2-40B4-BE49-F238E27FC236}">
+                <a16:creationId xmlns:a16="http://schemas.microsoft.com/office/drawing/2014/main" id="{0C66F468-62B7-3B86-5049-6AC5F83BBB34}"/>
+              </a:ext>
+            </a:extLst>
+          </p:cNvPr>
+          <p:cNvSpPr>
+            <a:spLocks noGrp="1"/>
+          </p:cNvSpPr>
+          <p:nvPr>
+            <p:ph idx="1"/>
+          </p:nvPr>
+        </p:nvSpPr>
+        <p:spPr/>
+        <p:txBody>
+          <a:bodyPr/>
+          <a:lstStyle/>
+          <a:p>
+            <a:r>
+              <a:rPr lang="pl-PL" sz="3200">
+                <a:effectLst>
+                  <a:glow rad="38100">
+                    <a:prstClr val="black">
+                      <a:lumMod val="50000"/>
+                      <a:lumOff val="50000"/>
+                      <a:alpha val="20000"/>
+                    </a:prstClr>
+                  </a:glow>
+                  <a:outerShdw blurRad="44450" dist="12700" dir="13860000" algn="tl" rotWithShape="0">
+                    <a:srgbClr val="000000">
+                      <a:alpha val="20000"/>
+                    </a:srgbClr>
+                  </a:outerShdw>
+                </a:effectLst>
+              </a:rPr>
+              <a:t>C#</a:t>
+            </a:r>
+          </a:p>
+          <a:p>
+            <a:pPr>
+              <a:buClr>
+                <a:srgbClr val="FFFFFF"/>
+              </a:buClr>
+            </a:pPr>
+            <a:r>
+              <a:rPr lang="pl-PL" sz="3200">
+                <a:effectLst>
+                  <a:glow rad="38100">
+                    <a:prstClr val="black">
+                      <a:lumMod val="50000"/>
+                      <a:lumOff val="50000"/>
+                      <a:alpha val="20000"/>
+                    </a:prstClr>
+                  </a:glow>
+                  <a:outerShdw blurRad="44450" dist="12700" dir="13860000" algn="tl" rotWithShape="0">
+                    <a:srgbClr val="000000">
+                      <a:alpha val="20000"/>
+                    </a:srgbClr>
+                  </a:outerShdw>
+                </a:effectLst>
+              </a:rPr>
+              <a:t>Java</a:t>
+            </a:r>
+          </a:p>
+          <a:p>
+            <a:pPr>
+              <a:buClr>
+                <a:srgbClr val="FFFFFF"/>
+              </a:buClr>
+            </a:pPr>
+            <a:r>
+              <a:rPr lang="pl-PL" sz="3200" err="1">
+                <a:effectLst>
+                  <a:glow rad="38100">
+                    <a:prstClr val="black">
+                      <a:lumMod val="50000"/>
+                      <a:lumOff val="50000"/>
+                      <a:alpha val="20000"/>
+                    </a:prstClr>
+                  </a:glow>
+                  <a:outerShdw blurRad="44450" dist="12700" dir="13860000" algn="tl" rotWithShape="0">
+                    <a:srgbClr val="000000">
+                      <a:alpha val="20000"/>
+                    </a:srgbClr>
+                  </a:outerShdw>
+                </a:effectLst>
+              </a:rPr>
+              <a:t>Python</a:t>
+            </a:r>
+            <a:endParaRPr lang="pl-PL" sz="3200">
+              <a:effectLst>
+                <a:glow rad="38100">
+                  <a:prstClr val="black">
+                    <a:lumMod val="50000"/>
+                    <a:lumOff val="50000"/>
+                    <a:alpha val="20000"/>
+                  </a:prstClr>
+                </a:glow>
+                <a:outerShdw blurRad="44450" dist="12700" dir="13860000" algn="tl" rotWithShape="0">
+                  <a:srgbClr val="000000">
+                    <a:alpha val="20000"/>
+                  </a:srgbClr>
+                </a:outerShdw>
+              </a:effectLst>
+            </a:endParaRPr>
+          </a:p>
+          <a:p>
+            <a:pPr>
+              <a:buClr>
+                <a:srgbClr val="FFFFFF"/>
+              </a:buClr>
+            </a:pPr>
+            <a:r>
+              <a:rPr lang="pl-PL" sz="3200">
+                <a:effectLst>
+                  <a:glow rad="38100">
+                    <a:prstClr val="black">
+                      <a:lumMod val="50000"/>
+                      <a:lumOff val="50000"/>
+                      <a:alpha val="20000"/>
+                    </a:prstClr>
+                  </a:glow>
+                  <a:outerShdw blurRad="44450" dist="12700" dir="13860000" algn="tl" rotWithShape="0">
+                    <a:srgbClr val="000000">
+                      <a:alpha val="20000"/>
+                    </a:srgbClr>
+                  </a:outerShdw>
+                </a:effectLst>
+              </a:rPr>
+              <a:t>C++</a:t>
+            </a:r>
+          </a:p>
+        </p:txBody>
+      </p:sp>
+    </p:spTree>
+    <p:extLst>
+      <p:ext uri="{BB962C8B-B14F-4D97-AF65-F5344CB8AC3E}">
+        <p14:creationId xmlns:p14="http://schemas.microsoft.com/office/powerpoint/2010/main" val="3653560086"/>
+      </p:ext>
+    </p:extLst>
+  </p:cSld>
+  <p:clrMapOvr>
+    <a:masterClrMapping/>
+  </p:clrMapOvr>
+</p:sld>
+</file>
+
+<file path=ppt/slides/slide7.xml><?xml version="1.0" encoding="utf-8"?>
+<p:sld xmlns:a="http://schemas.openxmlformats.org/drawingml/2006/main" xmlns:r="http://schemas.openxmlformats.org/officeDocument/2006/relationships" xmlns:p="http://schemas.openxmlformats.org/presentationml/2006/main">
+  <p:cSld>
+    <p:spTree>
+      <p:nvGrpSpPr>
+        <p:cNvPr id="1" name=""/>
+        <p:cNvGrpSpPr/>
+        <p:nvPr/>
+      </p:nvGrpSpPr>
+      <p:grpSpPr>
+        <a:xfrm>
+          <a:off x="0" y="0"/>
+          <a:ext cx="0" cy="0"/>
+          <a:chOff x="0" y="0"/>
+          <a:chExt cx="0" cy="0"/>
+        </a:xfrm>
+      </p:grpSpPr>
+      <p:sp>
+        <p:nvSpPr>
+          <p:cNvPr id="2" name="Tytuł 1">
+            <a:extLst>
+              <a:ext uri="{FF2B5EF4-FFF2-40B4-BE49-F238E27FC236}">
+                <a16:creationId xmlns:a16="http://schemas.microsoft.com/office/drawing/2014/main" id="{5C1BD555-F91A-1977-2DAE-82462E9CE540}"/>
+              </a:ext>
+            </a:extLst>
+          </p:cNvPr>
+          <p:cNvSpPr>
+            <a:spLocks noGrp="1"/>
+          </p:cNvSpPr>
+          <p:nvPr>
+            <p:ph type="title"/>
+          </p:nvPr>
+        </p:nvSpPr>
+        <p:spPr>
+          <a:xfrm>
+            <a:off x="1141413" y="2473287"/>
+            <a:ext cx="9905998" cy="1905000"/>
+          </a:xfrm>
+        </p:spPr>
+        <p:txBody>
+          <a:bodyPr/>
+          <a:lstStyle/>
+          <a:p>
+            <a:pPr algn="ctr"/>
             <a:r>
               <a:rPr lang="pl-PL" dirty="0">
                 <a:effectLst>
@@ -6748,145 +7839,7 @@
                   </a:outerShdw>
                 </a:effectLst>
               </a:rPr>
-              <a:t>Przykłady Języków bazujących na podejściu obiektowym</a:t>
-            </a:r>
-            <a:endParaRPr lang="pl-PL" dirty="0"/>
-          </a:p>
-        </p:txBody>
-      </p:sp>
-      <p:sp>
-        <p:nvSpPr>
-          <p:cNvPr id="3" name="Symbol zastępczy zawartości 2">
-            <a:extLst>
-              <a:ext uri="{FF2B5EF4-FFF2-40B4-BE49-F238E27FC236}">
-                <a16:creationId xmlns:a16="http://schemas.microsoft.com/office/drawing/2014/main" id="{0C66F468-62B7-3B86-5049-6AC5F83BBB34}"/>
-              </a:ext>
-            </a:extLst>
-          </p:cNvPr>
-          <p:cNvSpPr>
-            <a:spLocks noGrp="1"/>
-          </p:cNvSpPr>
-          <p:nvPr>
-            <p:ph idx="1"/>
-          </p:nvPr>
-        </p:nvSpPr>
-        <p:spPr/>
-        <p:txBody>
-          <a:bodyPr/>
-          <a:lstStyle/>
-          <a:p>
-            <a:r>
-              <a:rPr lang="pl-PL" sz="3200" dirty="0">
-                <a:effectLst>
-                  <a:glow rad="38100">
-                    <a:prstClr val="black">
-                      <a:lumMod val="50000"/>
-                      <a:lumOff val="50000"/>
-                      <a:alpha val="20000"/>
-                    </a:prstClr>
-                  </a:glow>
-                  <a:outerShdw blurRad="44450" dist="12700" dir="13860000" algn="tl" rotWithShape="0">
-                    <a:srgbClr val="000000">
-                      <a:alpha val="20000"/>
-                    </a:srgbClr>
-                  </a:outerShdw>
-                </a:effectLst>
-              </a:rPr>
-              <a:t>C#</a:t>
-            </a:r>
-          </a:p>
-          <a:p>
-            <a:pPr>
-              <a:buClr>
-                <a:srgbClr val="FFFFFF"/>
-              </a:buClr>
-            </a:pPr>
-            <a:r>
-              <a:rPr lang="pl-PL" sz="3200" dirty="0">
-                <a:effectLst>
-                  <a:glow rad="38100">
-                    <a:prstClr val="black">
-                      <a:lumMod val="50000"/>
-                      <a:lumOff val="50000"/>
-                      <a:alpha val="20000"/>
-                    </a:prstClr>
-                  </a:glow>
-                  <a:outerShdw blurRad="44450" dist="12700" dir="13860000" algn="tl" rotWithShape="0">
-                    <a:srgbClr val="000000">
-                      <a:alpha val="20000"/>
-                    </a:srgbClr>
-                  </a:outerShdw>
-                </a:effectLst>
-              </a:rPr>
-              <a:t>Java</a:t>
-            </a:r>
-          </a:p>
-          <a:p>
-            <a:pPr>
-              <a:buClr>
-                <a:srgbClr val="FFFFFF"/>
-              </a:buClr>
-            </a:pPr>
-            <a:r>
-              <a:rPr lang="pl-PL" sz="3200" dirty="0" err="1">
-                <a:effectLst>
-                  <a:glow rad="38100">
-                    <a:prstClr val="black">
-                      <a:lumMod val="50000"/>
-                      <a:lumOff val="50000"/>
-                      <a:alpha val="20000"/>
-                    </a:prstClr>
-                  </a:glow>
-                  <a:outerShdw blurRad="44450" dist="12700" dir="13860000" algn="tl" rotWithShape="0">
-                    <a:srgbClr val="000000">
-                      <a:alpha val="20000"/>
-                    </a:srgbClr>
-                  </a:outerShdw>
-                </a:effectLst>
-              </a:rPr>
-              <a:t>Python</a:t>
-            </a:r>
-            <a:endParaRPr lang="pl-PL" sz="3200">
-              <a:effectLst>
-                <a:glow rad="38100">
-                  <a:prstClr val="black">
-                    <a:lumMod val="50000"/>
-                    <a:lumOff val="50000"/>
-                    <a:alpha val="20000"/>
-                  </a:prstClr>
-                </a:glow>
-                <a:outerShdw blurRad="44450" dist="12700" dir="13860000" algn="tl" rotWithShape="0">
-                  <a:srgbClr val="000000">
-                    <a:alpha val="20000"/>
-                  </a:srgbClr>
-                </a:outerShdw>
-              </a:effectLst>
-            </a:endParaRPr>
-          </a:p>
-          <a:p>
-            <a:pPr>
-              <a:buClr>
-                <a:srgbClr val="FFFFFF"/>
-              </a:buClr>
-            </a:pPr>
-            <a:r>
-              <a:rPr lang="pl-PL" sz="3200" dirty="0">
-                <a:effectLst>
-                  <a:glow rad="38100">
-                    <a:prstClr val="black">
-                      <a:lumMod val="50000"/>
-                      <a:lumOff val="50000"/>
-                      <a:alpha val="20000"/>
-                    </a:prstClr>
-                  </a:glow>
-                  <a:outerShdw blurRad="44450" dist="12700" dir="13860000" algn="tl" rotWithShape="0">
-                    <a:srgbClr val="000000">
-                      <a:alpha val="20000"/>
-                    </a:srgbClr>
-                  </a:outerShdw>
-                </a:effectLst>
-              </a:rPr>
-              <a:t>C++</a:t>
+              <a:t>Dziękuję za uwagę</a:t>
             </a:r>
           </a:p>
         </p:txBody>
@@ -6894,7 +7847,7 @@
     </p:spTree>
     <p:extLst>
       <p:ext uri="{BB962C8B-B14F-4D97-AF65-F5344CB8AC3E}">
-        <p14:creationId xmlns:p14="http://schemas.microsoft.com/office/powerpoint/2010/main" val="3653560086"/>
+        <p14:creationId xmlns:p14="http://schemas.microsoft.com/office/powerpoint/2010/main" val="877953814"/>
       </p:ext>
     </p:extLst>
   </p:cSld>

</xml_diff>